<commit_message>
Cleanup of old pending updates
</commit_message>
<xml_diff>
--- a/Chap/Prog02/Presentations/DRY.pptx
+++ b/Chap/Prog02/Presentations/DRY.pptx
@@ -22,10 +22,9 @@
     <p:sldId id="493" r:id="rId16"/>
     <p:sldId id="494" r:id="rId17"/>
     <p:sldId id="497" r:id="rId18"/>
-    <p:sldId id="498" r:id="rId19"/>
-    <p:sldId id="500" r:id="rId20"/>
-    <p:sldId id="501" r:id="rId21"/>
-    <p:sldId id="502" r:id="rId22"/>
+    <p:sldId id="500" r:id="rId19"/>
+    <p:sldId id="501" r:id="rId20"/>
+    <p:sldId id="502" r:id="rId21"/>
   </p:sldIdLst>
   <p:sldSz cx="12192000" cy="6858000"/>
   <p:notesSz cx="6858000" cy="9144000"/>
@@ -261,7 +260,7 @@
           <a:p>
             <a:fld id="{E15B7D8E-2A20-4C0E-991C-872DBB7459A8}" type="datetimeFigureOut">
               <a:rPr lang="da-DK" smtClean="0"/>
-              <a:t>11-08-2022</a:t>
+              <a:t>26-10-2023</a:t>
             </a:fld>
             <a:endParaRPr lang="da-DK"/>
           </a:p>
@@ -429,7 +428,7 @@
           <a:p>
             <a:fld id="{E15B7D8E-2A20-4C0E-991C-872DBB7459A8}" type="datetimeFigureOut">
               <a:rPr lang="da-DK" smtClean="0"/>
-              <a:t>11-08-2022</a:t>
+              <a:t>26-10-2023</a:t>
             </a:fld>
             <a:endParaRPr lang="da-DK"/>
           </a:p>
@@ -607,7 +606,7 @@
           <a:p>
             <a:fld id="{E15B7D8E-2A20-4C0E-991C-872DBB7459A8}" type="datetimeFigureOut">
               <a:rPr lang="da-DK" smtClean="0"/>
-              <a:t>11-08-2022</a:t>
+              <a:t>26-10-2023</a:t>
             </a:fld>
             <a:endParaRPr lang="da-DK"/>
           </a:p>
@@ -775,7 +774,7 @@
           <a:p>
             <a:fld id="{E15B7D8E-2A20-4C0E-991C-872DBB7459A8}" type="datetimeFigureOut">
               <a:rPr lang="da-DK" smtClean="0"/>
-              <a:t>11-08-2022</a:t>
+              <a:t>26-10-2023</a:t>
             </a:fld>
             <a:endParaRPr lang="da-DK"/>
           </a:p>
@@ -1020,7 +1019,7 @@
           <a:p>
             <a:fld id="{E15B7D8E-2A20-4C0E-991C-872DBB7459A8}" type="datetimeFigureOut">
               <a:rPr lang="da-DK" smtClean="0"/>
-              <a:t>11-08-2022</a:t>
+              <a:t>26-10-2023</a:t>
             </a:fld>
             <a:endParaRPr lang="da-DK"/>
           </a:p>
@@ -1249,7 +1248,7 @@
           <a:p>
             <a:fld id="{E15B7D8E-2A20-4C0E-991C-872DBB7459A8}" type="datetimeFigureOut">
               <a:rPr lang="da-DK" smtClean="0"/>
-              <a:t>11-08-2022</a:t>
+              <a:t>26-10-2023</a:t>
             </a:fld>
             <a:endParaRPr lang="da-DK"/>
           </a:p>
@@ -1613,7 +1612,7 @@
           <a:p>
             <a:fld id="{E15B7D8E-2A20-4C0E-991C-872DBB7459A8}" type="datetimeFigureOut">
               <a:rPr lang="da-DK" smtClean="0"/>
-              <a:t>11-08-2022</a:t>
+              <a:t>26-10-2023</a:t>
             </a:fld>
             <a:endParaRPr lang="da-DK"/>
           </a:p>
@@ -1730,7 +1729,7 @@
           <a:p>
             <a:fld id="{E15B7D8E-2A20-4C0E-991C-872DBB7459A8}" type="datetimeFigureOut">
               <a:rPr lang="da-DK" smtClean="0"/>
-              <a:t>11-08-2022</a:t>
+              <a:t>26-10-2023</a:t>
             </a:fld>
             <a:endParaRPr lang="da-DK"/>
           </a:p>
@@ -1825,7 +1824,7 @@
           <a:p>
             <a:fld id="{E15B7D8E-2A20-4C0E-991C-872DBB7459A8}" type="datetimeFigureOut">
               <a:rPr lang="da-DK" smtClean="0"/>
-              <a:t>11-08-2022</a:t>
+              <a:t>26-10-2023</a:t>
             </a:fld>
             <a:endParaRPr lang="da-DK"/>
           </a:p>
@@ -2100,7 +2099,7 @@
           <a:p>
             <a:fld id="{E15B7D8E-2A20-4C0E-991C-872DBB7459A8}" type="datetimeFigureOut">
               <a:rPr lang="da-DK" smtClean="0"/>
-              <a:t>11-08-2022</a:t>
+              <a:t>26-10-2023</a:t>
             </a:fld>
             <a:endParaRPr lang="da-DK"/>
           </a:p>
@@ -2352,7 +2351,7 @@
           <a:p>
             <a:fld id="{E15B7D8E-2A20-4C0E-991C-872DBB7459A8}" type="datetimeFigureOut">
               <a:rPr lang="da-DK" smtClean="0"/>
-              <a:t>11-08-2022</a:t>
+              <a:t>26-10-2023</a:t>
             </a:fld>
             <a:endParaRPr lang="da-DK"/>
           </a:p>
@@ -2563,7 +2562,7 @@
           <a:p>
             <a:fld id="{E15B7D8E-2A20-4C0E-991C-872DBB7459A8}" type="datetimeFigureOut">
               <a:rPr lang="da-DK" smtClean="0"/>
-              <a:t>11-08-2022</a:t>
+              <a:t>26-10-2023</a:t>
             </a:fld>
             <a:endParaRPr lang="da-DK"/>
           </a:p>
@@ -4067,7 +4066,7 @@
           <a:lstStyle/>
           <a:p>
             <a:r>
-              <a:rPr lang="da-DK" sz="2400" b="1">
+              <a:rPr lang="da-DK" sz="2400" b="1" dirty="0">
                 <a:solidFill>
                   <a:srgbClr val="0070C0"/>
                 </a:solidFill>
@@ -4076,7 +4075,7 @@
               <a:t>public class </a:t>
             </a:r>
             <a:r>
-              <a:rPr lang="da-DK" sz="2400" b="1">
+              <a:rPr lang="da-DK" sz="2400" b="1" dirty="0">
                 <a:solidFill>
                   <a:schemeClr val="accent6">
                     <a:lumMod val="75000"/>
@@ -4089,7 +4088,7 @@
           </a:p>
           <a:p>
             <a:r>
-              <a:rPr lang="da-DK" sz="2400" b="1">
+              <a:rPr lang="da-DK" sz="2400" b="1" dirty="0">
                 <a:latin typeface="Consolas" panose="020B0609020204030204" pitchFamily="49" charset="0"/>
               </a:rPr>
               <a:t>{</a:t>
@@ -4097,35 +4096,56 @@
           </a:p>
           <a:p>
             <a:r>
-              <a:rPr lang="da-DK" sz="2400" b="1">
+              <a:rPr lang="da-DK" sz="2400" b="1" dirty="0">
                 <a:latin typeface="Consolas" panose="020B0609020204030204" pitchFamily="49" charset="0"/>
               </a:rPr>
               <a:t>   </a:t>
             </a:r>
             <a:r>
-              <a:rPr lang="da-DK" sz="2400" b="1">
+              <a:rPr lang="da-DK" sz="2400" b="1" dirty="0">
                 <a:solidFill>
                   <a:srgbClr val="0070C0"/>
                 </a:solidFill>
                 <a:latin typeface="Consolas" panose="020B0609020204030204" pitchFamily="49" charset="0"/>
               </a:rPr>
-              <a:t>private int</a:t>
-            </a:r>
-            <a:r>
-              <a:rPr lang="da-DK" sz="2400" b="1">
-                <a:latin typeface="Consolas" panose="020B0609020204030204" pitchFamily="49" charset="0"/>
-              </a:rPr>
-              <a:t> _noOfFaces;</a:t>
-            </a:r>
-          </a:p>
-          <a:p>
-            <a:endParaRPr lang="da-DK" sz="2400" b="1">
+              <a:t>private </a:t>
+            </a:r>
+            <a:r>
+              <a:rPr lang="da-DK" sz="2400" b="1" dirty="0" err="1">
+                <a:solidFill>
+                  <a:srgbClr val="0070C0"/>
+                </a:solidFill>
+                <a:latin typeface="Consolas" panose="020B0609020204030204" pitchFamily="49" charset="0"/>
+              </a:rPr>
+              <a:t>int</a:t>
+            </a:r>
+            <a:r>
+              <a:rPr lang="da-DK" sz="2400" b="1" dirty="0">
+                <a:latin typeface="Consolas" panose="020B0609020204030204" pitchFamily="49" charset="0"/>
+              </a:rPr>
+              <a:t> _</a:t>
+            </a:r>
+            <a:r>
+              <a:rPr lang="da-DK" sz="2400" b="1" dirty="0" err="1">
+                <a:latin typeface="Consolas" panose="020B0609020204030204" pitchFamily="49" charset="0"/>
+              </a:rPr>
+              <a:t>noOfFaces</a:t>
+            </a:r>
+            <a:r>
+              <a:rPr lang="da-DK" sz="2400" b="1" dirty="0">
+                <a:latin typeface="Consolas" panose="020B0609020204030204" pitchFamily="49" charset="0"/>
+              </a:rPr>
+              <a:t>;</a:t>
+            </a:r>
+          </a:p>
+          <a:p>
+            <a:endParaRPr lang="da-DK" sz="2400" b="1" dirty="0">
               <a:latin typeface="Consolas" panose="020B0609020204030204" pitchFamily="49" charset="0"/>
             </a:endParaRPr>
           </a:p>
           <a:p>
             <a:r>
-              <a:rPr lang="da-DK" sz="2400" b="1">
+              <a:rPr lang="da-DK" sz="2400" b="1" dirty="0">
                 <a:solidFill>
                   <a:srgbClr val="0070C0"/>
                 </a:solidFill>
@@ -4134,30 +4154,45 @@
               <a:t>   public</a:t>
             </a:r>
             <a:r>
-              <a:rPr lang="da-DK" sz="2400" b="1">
+              <a:rPr lang="da-DK" sz="2400" b="1" dirty="0">
                 <a:latin typeface="Consolas" panose="020B0609020204030204" pitchFamily="49" charset="0"/>
               </a:rPr>
               <a:t> Die(</a:t>
             </a:r>
             <a:r>
-              <a:rPr lang="da-DK" sz="2400" b="1">
+              <a:rPr lang="da-DK" sz="2400" b="1" dirty="0" err="1">
                 <a:solidFill>
                   <a:srgbClr val="0070C0"/>
                 </a:solidFill>
                 <a:latin typeface="Consolas" panose="020B0609020204030204" pitchFamily="49" charset="0"/>
               </a:rPr>
-              <a:t>int </a:t>
-            </a:r>
-            <a:r>
-              <a:rPr lang="da-DK" sz="2400" b="1">
-                <a:latin typeface="Consolas" panose="020B0609020204030204" pitchFamily="49" charset="0"/>
-              </a:rPr>
-              <a:t>noOfFaces)</a:t>
-            </a:r>
-          </a:p>
-          <a:p>
-            <a:r>
-              <a:rPr lang="da-DK" sz="2400" b="1">
+              <a:t>int</a:t>
+            </a:r>
+            <a:r>
+              <a:rPr lang="da-DK" sz="2400" b="1" dirty="0">
+                <a:solidFill>
+                  <a:srgbClr val="0070C0"/>
+                </a:solidFill>
+                <a:latin typeface="Consolas" panose="020B0609020204030204" pitchFamily="49" charset="0"/>
+              </a:rPr>
+              <a:t> </a:t>
+            </a:r>
+            <a:r>
+              <a:rPr lang="da-DK" sz="2400" b="1" dirty="0" err="1">
+                <a:latin typeface="Consolas" panose="020B0609020204030204" pitchFamily="49" charset="0"/>
+              </a:rPr>
+              <a:t>noOfFaces</a:t>
+            </a:r>
+            <a:r>
+              <a:rPr lang="da-DK" sz="2400" b="1" dirty="0">
+                <a:latin typeface="Consolas" panose="020B0609020204030204" pitchFamily="49" charset="0"/>
+              </a:rPr>
+              <a:t>)</a:t>
+            </a:r>
+          </a:p>
+          <a:p>
+            <a:r>
+              <a:rPr lang="da-DK" sz="2400" b="1" dirty="0">
                 <a:latin typeface="Consolas" panose="020B0609020204030204" pitchFamily="49" charset="0"/>
               </a:rPr>
               <a:t>   {</a:t>
@@ -4165,43 +4200,76 @@
           </a:p>
           <a:p>
             <a:r>
-              <a:rPr lang="da-DK" sz="2400" b="1">
-                <a:latin typeface="Consolas" panose="020B0609020204030204" pitchFamily="49" charset="0"/>
-              </a:rPr>
-              <a:t>      _noOfFaces = noOfFaces;</a:t>
-            </a:r>
-          </a:p>
-          <a:p>
-            <a:r>
-              <a:rPr lang="da-DK" sz="2400" b="1">
+              <a:rPr lang="da-DK" sz="2400" b="1" dirty="0">
+                <a:latin typeface="Consolas" panose="020B0609020204030204" pitchFamily="49" charset="0"/>
+              </a:rPr>
+              <a:t>      _</a:t>
+            </a:r>
+            <a:r>
+              <a:rPr lang="da-DK" sz="2400" b="1" dirty="0" err="1">
+                <a:latin typeface="Consolas" panose="020B0609020204030204" pitchFamily="49" charset="0"/>
+              </a:rPr>
+              <a:t>noOfFaces</a:t>
+            </a:r>
+            <a:r>
+              <a:rPr lang="da-DK" sz="2400" b="1" dirty="0">
+                <a:latin typeface="Consolas" panose="020B0609020204030204" pitchFamily="49" charset="0"/>
+              </a:rPr>
+              <a:t> = </a:t>
+            </a:r>
+            <a:r>
+              <a:rPr lang="da-DK" sz="2400" b="1" dirty="0" err="1">
+                <a:latin typeface="Consolas" panose="020B0609020204030204" pitchFamily="49" charset="0"/>
+              </a:rPr>
+              <a:t>noOfFaces</a:t>
+            </a:r>
+            <a:r>
+              <a:rPr lang="da-DK" sz="2400" b="1" dirty="0">
+                <a:latin typeface="Consolas" panose="020B0609020204030204" pitchFamily="49" charset="0"/>
+              </a:rPr>
+              <a:t>;</a:t>
+            </a:r>
+          </a:p>
+          <a:p>
+            <a:r>
+              <a:rPr lang="da-DK" sz="2400" b="1" dirty="0">
                 <a:latin typeface="Consolas" panose="020B0609020204030204" pitchFamily="49" charset="0"/>
               </a:rPr>
               <a:t>   }</a:t>
             </a:r>
           </a:p>
           <a:p>
-            <a:endParaRPr lang="da-DK" sz="2400" b="1">
+            <a:endParaRPr lang="da-DK" sz="2400" b="1" dirty="0">
               <a:latin typeface="Consolas" panose="020B0609020204030204" pitchFamily="49" charset="0"/>
             </a:endParaRPr>
           </a:p>
           <a:p>
             <a:r>
-              <a:rPr lang="da-DK" sz="2400" b="1">
+              <a:rPr lang="da-DK" sz="2400" b="1" dirty="0">
                 <a:latin typeface="Consolas" panose="020B0609020204030204" pitchFamily="49" charset="0"/>
               </a:rPr>
               <a:t>   </a:t>
             </a:r>
             <a:r>
-              <a:rPr lang="da-DK" sz="2400" b="1">
+              <a:rPr lang="da-DK" sz="2400" b="1" dirty="0">
                 <a:solidFill>
                   <a:srgbClr val="0070C0"/>
                 </a:solidFill>
                 <a:latin typeface="Consolas" panose="020B0609020204030204" pitchFamily="49" charset="0"/>
               </a:rPr>
-              <a:t>public void</a:t>
-            </a:r>
-            <a:r>
-              <a:rPr lang="da-DK" sz="2400" b="1">
+              <a:t>public </a:t>
+            </a:r>
+            <a:r>
+              <a:rPr lang="da-DK" sz="2400" b="1" dirty="0" err="1">
+                <a:solidFill>
+                  <a:srgbClr val="0070C0"/>
+                </a:solidFill>
+                <a:latin typeface="Consolas" panose="020B0609020204030204" pitchFamily="49" charset="0"/>
+              </a:rPr>
+              <a:t>void</a:t>
+            </a:r>
+            <a:r>
+              <a:rPr lang="da-DK" sz="2400" b="1" dirty="0">
                 <a:latin typeface="Consolas" panose="020B0609020204030204" pitchFamily="49" charset="0"/>
               </a:rPr>
               <a:t> Roll()</a:t>
@@ -4209,7 +4277,7 @@
           </a:p>
           <a:p>
             <a:r>
-              <a:rPr lang="da-DK" sz="2400" b="1">
+              <a:rPr lang="da-DK" sz="2400" b="1" dirty="0">
                 <a:latin typeface="Consolas" panose="020B0609020204030204" pitchFamily="49" charset="0"/>
               </a:rPr>
               <a:t>   {</a:t>
@@ -4217,15 +4285,51 @@
           </a:p>
           <a:p>
             <a:r>
-              <a:rPr lang="da-DK" sz="2400" b="1">
-                <a:latin typeface="Consolas" panose="020B0609020204030204" pitchFamily="49" charset="0"/>
-              </a:rPr>
-              <a:t>      _faceValue = _gen.Next(noOfFaces) + 1;</a:t>
-            </a:r>
-          </a:p>
-          <a:p>
-            <a:r>
-              <a:rPr lang="da-DK" sz="2400" b="1">
+              <a:rPr lang="da-DK" sz="2400" b="1" dirty="0">
+                <a:latin typeface="Consolas" panose="020B0609020204030204" pitchFamily="49" charset="0"/>
+              </a:rPr>
+              <a:t>      _</a:t>
+            </a:r>
+            <a:r>
+              <a:rPr lang="da-DK" sz="2400" b="1" dirty="0" err="1">
+                <a:latin typeface="Consolas" panose="020B0609020204030204" pitchFamily="49" charset="0"/>
+              </a:rPr>
+              <a:t>faceValue</a:t>
+            </a:r>
+            <a:r>
+              <a:rPr lang="da-DK" sz="2400" b="1" dirty="0">
+                <a:latin typeface="Consolas" panose="020B0609020204030204" pitchFamily="49" charset="0"/>
+              </a:rPr>
+              <a:t> = _</a:t>
+            </a:r>
+            <a:r>
+              <a:rPr lang="da-DK" sz="2400" b="1" dirty="0" err="1">
+                <a:latin typeface="Consolas" panose="020B0609020204030204" pitchFamily="49" charset="0"/>
+              </a:rPr>
+              <a:t>gen.Next</a:t>
+            </a:r>
+            <a:r>
+              <a:rPr lang="da-DK" sz="2400" b="1" dirty="0">
+                <a:latin typeface="Consolas" panose="020B0609020204030204" pitchFamily="49" charset="0"/>
+              </a:rPr>
+              <a:t>(_</a:t>
+            </a:r>
+            <a:r>
+              <a:rPr lang="da-DK" sz="2400" b="1" dirty="0" err="1">
+                <a:latin typeface="Consolas" panose="020B0609020204030204" pitchFamily="49" charset="0"/>
+              </a:rPr>
+              <a:t>noOfFaces</a:t>
+            </a:r>
+            <a:r>
+              <a:rPr lang="da-DK" sz="2400" b="1" dirty="0">
+                <a:latin typeface="Consolas" panose="020B0609020204030204" pitchFamily="49" charset="0"/>
+              </a:rPr>
+              <a:t>) + 1;</a:t>
+            </a:r>
+          </a:p>
+          <a:p>
+            <a:r>
+              <a:rPr lang="da-DK" sz="2400" b="1" dirty="0">
                 <a:latin typeface="Consolas" panose="020B0609020204030204" pitchFamily="49" charset="0"/>
               </a:rPr>
               <a:t>   }</a:t>
@@ -4233,7 +4337,7 @@
           </a:p>
           <a:p>
             <a:r>
-              <a:rPr lang="da-DK" sz="2400" b="1">
+              <a:rPr lang="da-DK" sz="2400" b="1" dirty="0">
                 <a:latin typeface="Consolas" panose="020B0609020204030204" pitchFamily="49" charset="0"/>
               </a:rPr>
               <a:t>}</a:t>
@@ -7114,77 +7218,6 @@
           <a:chExt cx="0" cy="0"/>
         </a:xfrm>
       </p:grpSpPr>
-      <p:pic>
-        <p:nvPicPr>
-          <p:cNvPr id="2050" name="Picture 2" descr="Billedresultat for refactoring meme"/>
-          <p:cNvPicPr>
-            <a:picLocks noChangeAspect="1" noChangeArrowheads="1"/>
-          </p:cNvPicPr>
-          <p:nvPr/>
-        </p:nvPicPr>
-        <p:blipFill>
-          <a:blip r:embed="rId2">
-            <a:extLst>
-              <a:ext uri="{28A0092B-C50C-407E-A947-70E740481C1C}">
-                <a14:useLocalDpi xmlns:a14="http://schemas.microsoft.com/office/drawing/2010/main" val="0"/>
-              </a:ext>
-            </a:extLst>
-          </a:blip>
-          <a:srcRect/>
-          <a:stretch>
-            <a:fillRect/>
-          </a:stretch>
-        </p:blipFill>
-        <p:spPr bwMode="auto">
-          <a:xfrm>
-            <a:off x="1906884" y="862469"/>
-            <a:ext cx="8345348" cy="5484086"/>
-          </a:xfrm>
-          <a:prstGeom prst="rect">
-            <a:avLst/>
-          </a:prstGeom>
-          <a:noFill/>
-          <a:extLst>
-            <a:ext uri="{909E8E84-426E-40DD-AFC4-6F175D3DCCD1}">
-              <a14:hiddenFill xmlns:a14="http://schemas.microsoft.com/office/drawing/2010/main">
-                <a:solidFill>
-                  <a:srgbClr val="FFFFFF"/>
-                </a:solidFill>
-              </a14:hiddenFill>
-            </a:ext>
-          </a:extLst>
-        </p:spPr>
-      </p:pic>
-    </p:spTree>
-    <p:extLst>
-      <p:ext uri="{BB962C8B-B14F-4D97-AF65-F5344CB8AC3E}">
-        <p14:creationId xmlns:p14="http://schemas.microsoft.com/office/powerpoint/2010/main" val="575259916"/>
-      </p:ext>
-    </p:extLst>
-  </p:cSld>
-  <p:clrMapOvr>
-    <a:masterClrMapping/>
-  </p:clrMapOvr>
-</p:sld>
-</file>
-
-<file path=ppt/slides/slide19.xml><?xml version="1.0" encoding="utf-8"?>
-<p:sld xmlns:a="http://schemas.openxmlformats.org/drawingml/2006/main" xmlns:r="http://schemas.openxmlformats.org/officeDocument/2006/relationships" xmlns:p="http://schemas.openxmlformats.org/presentationml/2006/main">
-  <p:cSld>
-    <p:spTree>
-      <p:nvGrpSpPr>
-        <p:cNvPr id="1" name=""/>
-        <p:cNvGrpSpPr/>
-        <p:nvPr/>
-      </p:nvGrpSpPr>
-      <p:grpSpPr>
-        <a:xfrm>
-          <a:off x="0" y="0"/>
-          <a:ext cx="0" cy="0"/>
-          <a:chOff x="0" y="0"/>
-          <a:chExt cx="0" cy="0"/>
-        </a:xfrm>
-      </p:grpSpPr>
       <p:sp>
         <p:nvSpPr>
           <p:cNvPr id="2" name="Rektangel 1"/>
@@ -7921,143 +7954,7 @@
 </p:sld>
 </file>
 
-<file path=ppt/slides/slide2.xml><?xml version="1.0" encoding="utf-8"?>
-<p:sld xmlns:a="http://schemas.openxmlformats.org/drawingml/2006/main" xmlns:r="http://schemas.openxmlformats.org/officeDocument/2006/relationships" xmlns:p="http://schemas.openxmlformats.org/presentationml/2006/main">
-  <p:cSld>
-    <p:spTree>
-      <p:nvGrpSpPr>
-        <p:cNvPr id="1" name=""/>
-        <p:cNvGrpSpPr/>
-        <p:nvPr/>
-      </p:nvGrpSpPr>
-      <p:grpSpPr>
-        <a:xfrm>
-          <a:off x="0" y="0"/>
-          <a:ext cx="0" cy="0"/>
-          <a:chOff x="0" y="0"/>
-          <a:chExt cx="0" cy="0"/>
-        </a:xfrm>
-      </p:grpSpPr>
-      <p:sp>
-        <p:nvSpPr>
-          <p:cNvPr id="2" name="Titel 1"/>
-          <p:cNvSpPr>
-            <a:spLocks noGrp="1"/>
-          </p:cNvSpPr>
-          <p:nvPr>
-            <p:ph type="title"/>
-          </p:nvPr>
-        </p:nvSpPr>
-        <p:spPr/>
-        <p:txBody>
-          <a:bodyPr>
-            <a:normAutofit/>
-          </a:bodyPr>
-          <a:lstStyle/>
-          <a:p>
-            <a:r>
-              <a:rPr lang="da-DK" sz="4800" b="1">
-                <a:solidFill>
-                  <a:srgbClr val="FF0000"/>
-                </a:solidFill>
-              </a:rPr>
-              <a:t>D</a:t>
-            </a:r>
-            <a:r>
-              <a:rPr lang="da-DK" sz="4800" b="1"/>
-              <a:t>on’t </a:t>
-            </a:r>
-            <a:r>
-              <a:rPr lang="da-DK" sz="4800" b="1">
-                <a:solidFill>
-                  <a:srgbClr val="FF0000"/>
-                </a:solidFill>
-              </a:rPr>
-              <a:t>R</a:t>
-            </a:r>
-            <a:r>
-              <a:rPr lang="da-DK" sz="4800" b="1"/>
-              <a:t>epeat </a:t>
-            </a:r>
-            <a:r>
-              <a:rPr lang="da-DK" sz="4800" b="1">
-                <a:solidFill>
-                  <a:srgbClr val="FF0000"/>
-                </a:solidFill>
-              </a:rPr>
-              <a:t>Y</a:t>
-            </a:r>
-            <a:r>
-              <a:rPr lang="da-DK" sz="4800" b="1"/>
-              <a:t>ourself - Levels</a:t>
-            </a:r>
-          </a:p>
-        </p:txBody>
-      </p:sp>
-      <p:sp>
-        <p:nvSpPr>
-          <p:cNvPr id="3" name="Pladsholder til indhold 2"/>
-          <p:cNvSpPr>
-            <a:spLocks noGrp="1"/>
-          </p:cNvSpPr>
-          <p:nvPr>
-            <p:ph idx="1"/>
-          </p:nvPr>
-        </p:nvSpPr>
-        <p:spPr/>
-        <p:txBody>
-          <a:bodyPr>
-            <a:normAutofit/>
-          </a:bodyPr>
-          <a:lstStyle/>
-          <a:p>
-            <a:r>
-              <a:rPr lang="da-DK" sz="4000">
-                <a:latin typeface="+mj-lt"/>
-              </a:rPr>
-              <a:t>Value</a:t>
-            </a:r>
-          </a:p>
-          <a:p>
-            <a:r>
-              <a:rPr lang="da-DK" sz="4000">
-                <a:latin typeface="+mj-lt"/>
-              </a:rPr>
-              <a:t>Instance field</a:t>
-            </a:r>
-          </a:p>
-          <a:p>
-            <a:r>
-              <a:rPr lang="da-DK" sz="4000">
-                <a:latin typeface="+mj-lt"/>
-              </a:rPr>
-              <a:t>Method</a:t>
-            </a:r>
-          </a:p>
-          <a:p>
-            <a:r>
-              <a:rPr lang="da-DK" sz="4000">
-                <a:latin typeface="+mj-lt"/>
-              </a:rPr>
-              <a:t>Class</a:t>
-            </a:r>
-          </a:p>
-        </p:txBody>
-      </p:sp>
-    </p:spTree>
-    <p:extLst>
-      <p:ext uri="{BB962C8B-B14F-4D97-AF65-F5344CB8AC3E}">
-        <p14:creationId xmlns:p14="http://schemas.microsoft.com/office/powerpoint/2010/main" val="249085462"/>
-      </p:ext>
-    </p:extLst>
-  </p:cSld>
-  <p:clrMapOvr>
-    <a:masterClrMapping/>
-  </p:clrMapOvr>
-</p:sld>
-</file>
-
-<file path=ppt/slides/slide20.xml><?xml version="1.0" encoding="utf-8"?>
+<file path=ppt/slides/slide19.xml><?xml version="1.0" encoding="utf-8"?>
 <p:sld xmlns:a="http://schemas.openxmlformats.org/drawingml/2006/main" xmlns:r="http://schemas.openxmlformats.org/officeDocument/2006/relationships" xmlns:p="http://schemas.openxmlformats.org/presentationml/2006/main">
   <p:cSld>
     <p:spTree>
@@ -9015,7 +8912,143 @@
 </p:sld>
 </file>
 
-<file path=ppt/slides/slide21.xml><?xml version="1.0" encoding="utf-8"?>
+<file path=ppt/slides/slide2.xml><?xml version="1.0" encoding="utf-8"?>
+<p:sld xmlns:a="http://schemas.openxmlformats.org/drawingml/2006/main" xmlns:r="http://schemas.openxmlformats.org/officeDocument/2006/relationships" xmlns:p="http://schemas.openxmlformats.org/presentationml/2006/main">
+  <p:cSld>
+    <p:spTree>
+      <p:nvGrpSpPr>
+        <p:cNvPr id="1" name=""/>
+        <p:cNvGrpSpPr/>
+        <p:nvPr/>
+      </p:nvGrpSpPr>
+      <p:grpSpPr>
+        <a:xfrm>
+          <a:off x="0" y="0"/>
+          <a:ext cx="0" cy="0"/>
+          <a:chOff x="0" y="0"/>
+          <a:chExt cx="0" cy="0"/>
+        </a:xfrm>
+      </p:grpSpPr>
+      <p:sp>
+        <p:nvSpPr>
+          <p:cNvPr id="2" name="Titel 1"/>
+          <p:cNvSpPr>
+            <a:spLocks noGrp="1"/>
+          </p:cNvSpPr>
+          <p:nvPr>
+            <p:ph type="title"/>
+          </p:nvPr>
+        </p:nvSpPr>
+        <p:spPr/>
+        <p:txBody>
+          <a:bodyPr>
+            <a:normAutofit/>
+          </a:bodyPr>
+          <a:lstStyle/>
+          <a:p>
+            <a:r>
+              <a:rPr lang="da-DK" sz="4800" b="1">
+                <a:solidFill>
+                  <a:srgbClr val="FF0000"/>
+                </a:solidFill>
+              </a:rPr>
+              <a:t>D</a:t>
+            </a:r>
+            <a:r>
+              <a:rPr lang="da-DK" sz="4800" b="1"/>
+              <a:t>on’t </a:t>
+            </a:r>
+            <a:r>
+              <a:rPr lang="da-DK" sz="4800" b="1">
+                <a:solidFill>
+                  <a:srgbClr val="FF0000"/>
+                </a:solidFill>
+              </a:rPr>
+              <a:t>R</a:t>
+            </a:r>
+            <a:r>
+              <a:rPr lang="da-DK" sz="4800" b="1"/>
+              <a:t>epeat </a:t>
+            </a:r>
+            <a:r>
+              <a:rPr lang="da-DK" sz="4800" b="1">
+                <a:solidFill>
+                  <a:srgbClr val="FF0000"/>
+                </a:solidFill>
+              </a:rPr>
+              <a:t>Y</a:t>
+            </a:r>
+            <a:r>
+              <a:rPr lang="da-DK" sz="4800" b="1"/>
+              <a:t>ourself - Levels</a:t>
+            </a:r>
+          </a:p>
+        </p:txBody>
+      </p:sp>
+      <p:sp>
+        <p:nvSpPr>
+          <p:cNvPr id="3" name="Pladsholder til indhold 2"/>
+          <p:cNvSpPr>
+            <a:spLocks noGrp="1"/>
+          </p:cNvSpPr>
+          <p:nvPr>
+            <p:ph idx="1"/>
+          </p:nvPr>
+        </p:nvSpPr>
+        <p:spPr/>
+        <p:txBody>
+          <a:bodyPr>
+            <a:normAutofit/>
+          </a:bodyPr>
+          <a:lstStyle/>
+          <a:p>
+            <a:r>
+              <a:rPr lang="da-DK" sz="4000">
+                <a:latin typeface="+mj-lt"/>
+              </a:rPr>
+              <a:t>Value</a:t>
+            </a:r>
+          </a:p>
+          <a:p>
+            <a:r>
+              <a:rPr lang="da-DK" sz="4000">
+                <a:latin typeface="+mj-lt"/>
+              </a:rPr>
+              <a:t>Instance field</a:t>
+            </a:r>
+          </a:p>
+          <a:p>
+            <a:r>
+              <a:rPr lang="da-DK" sz="4000">
+                <a:latin typeface="+mj-lt"/>
+              </a:rPr>
+              <a:t>Method</a:t>
+            </a:r>
+          </a:p>
+          <a:p>
+            <a:r>
+              <a:rPr lang="da-DK" sz="4000">
+                <a:latin typeface="+mj-lt"/>
+              </a:rPr>
+              <a:t>Class</a:t>
+            </a:r>
+          </a:p>
+        </p:txBody>
+      </p:sp>
+    </p:spTree>
+    <p:extLst>
+      <p:ext uri="{BB962C8B-B14F-4D97-AF65-F5344CB8AC3E}">
+        <p14:creationId xmlns:p14="http://schemas.microsoft.com/office/powerpoint/2010/main" val="249085462"/>
+      </p:ext>
+    </p:extLst>
+  </p:cSld>
+  <p:clrMapOvr>
+    <a:masterClrMapping/>
+  </p:clrMapOvr>
+</p:sld>
+</file>
+
+<file path=ppt/slides/slide20.xml><?xml version="1.0" encoding="utf-8"?>
 <p:sld xmlns:a="http://schemas.openxmlformats.org/drawingml/2006/main" xmlns:r="http://schemas.openxmlformats.org/officeDocument/2006/relationships" xmlns:p="http://schemas.openxmlformats.org/presentationml/2006/main">
   <p:cSld>
     <p:spTree>

</xml_diff>